<commit_message>
Finished project and homework
</commit_message>
<xml_diff>
--- a/Week 4/Econ144_Lec7.pptx
+++ b/Week 4/Econ144_Lec7.pptx
@@ -249,7 +249,7 @@
             <a:fld id="{BE50BAC9-D96F-6043-9C24-3CA1CCA5BE71}" type="datetimeFigureOut">
               <a:rPr lang="en-US" smtClean="0"/>
               <a:pPr/>
-              <a:t>4/19/2018</a:t>
+              <a:t>4/26/2018</a:t>
             </a:fld>
             <a:endParaRPr lang="en-US"/>
           </a:p>
@@ -412,7 +412,7 @@
             <a:fld id="{4D414C45-A818-8343-8DB1-68AFBE94AD91}" type="datetimeFigureOut">
               <a:rPr lang="en-US" smtClean="0"/>
               <a:pPr/>
-              <a:t>4/19/2018</a:t>
+              <a:t>4/26/2018</a:t>
             </a:fld>
             <a:endParaRPr lang="en-US"/>
           </a:p>
@@ -1637,7 +1637,10 @@
           <a:bodyPr/>
           <a:lstStyle/>
           <a:p>
-            <a:endParaRPr lang="en-MY" dirty="0"/>
+            <a:r>
+              <a:rPr lang="en-MY" dirty="0"/>
+              <a:t>The higher the value of theta, the higher the magnitude of the PACF, but abs(theta)&lt;1 </a:t>
+            </a:r>
           </a:p>
         </p:txBody>
       </p:sp>
@@ -2039,7 +2042,7 @@
             <a:fld id="{C22F2E38-EDF2-0B4B-A1AE-2C9A9CC8448E}" type="datetime1">
               <a:rPr lang="en-US" smtClean="0"/>
               <a:pPr/>
-              <a:t>4/19/2018</a:t>
+              <a:t>4/26/2018</a:t>
             </a:fld>
             <a:endParaRPr lang="en-US"/>
           </a:p>
@@ -2204,7 +2207,7 @@
             <a:fld id="{7B4E94A1-FAB2-8540-996A-EF6238DC218B}" type="datetime1">
               <a:rPr lang="en-US" smtClean="0"/>
               <a:pPr/>
-              <a:t>4/19/2018</a:t>
+              <a:t>4/26/2018</a:t>
             </a:fld>
             <a:endParaRPr lang="en-US"/>
           </a:p>
@@ -2379,7 +2382,7 @@
             <a:fld id="{E4E3242E-FC60-354B-9E01-F98987CF91EA}" type="datetime1">
               <a:rPr lang="en-US" smtClean="0"/>
               <a:pPr/>
-              <a:t>4/19/2018</a:t>
+              <a:t>4/26/2018</a:t>
             </a:fld>
             <a:endParaRPr lang="en-US"/>
           </a:p>
@@ -2544,7 +2547,7 @@
             <a:fld id="{CE8A7A32-8E31-344A-9B2B-A10CFA75356E}" type="datetime1">
               <a:rPr lang="en-US" smtClean="0"/>
               <a:pPr/>
-              <a:t>4/19/2018</a:t>
+              <a:t>4/26/2018</a:t>
             </a:fld>
             <a:endParaRPr lang="en-US"/>
           </a:p>
@@ -2786,7 +2789,7 @@
             <a:fld id="{CAF3A19E-4A45-ED4F-BD27-B0EE52A51AF6}" type="datetime1">
               <a:rPr lang="en-US" smtClean="0"/>
               <a:pPr/>
-              <a:t>4/19/2018</a:t>
+              <a:t>4/26/2018</a:t>
             </a:fld>
             <a:endParaRPr lang="en-US"/>
           </a:p>
@@ -3068,7 +3071,7 @@
             <a:fld id="{DC8D4752-6B78-9841-8719-C037FEC45DC1}" type="datetime1">
               <a:rPr lang="en-US" smtClean="0"/>
               <a:pPr/>
-              <a:t>4/19/2018</a:t>
+              <a:t>4/26/2018</a:t>
             </a:fld>
             <a:endParaRPr lang="en-US"/>
           </a:p>
@@ -3484,7 +3487,7 @@
             <a:fld id="{ECA248A7-4584-084F-BB0A-E1A38D98CD94}" type="datetime1">
               <a:rPr lang="en-US" smtClean="0"/>
               <a:pPr/>
-              <a:t>4/19/2018</a:t>
+              <a:t>4/26/2018</a:t>
             </a:fld>
             <a:endParaRPr lang="en-US"/>
           </a:p>
@@ -3598,7 +3601,7 @@
             <a:fld id="{1234E8FB-B829-8A44-806E-D8D0FB4AB18A}" type="datetime1">
               <a:rPr lang="en-US" smtClean="0"/>
               <a:pPr/>
-              <a:t>4/19/2018</a:t>
+              <a:t>4/26/2018</a:t>
             </a:fld>
             <a:endParaRPr lang="en-US"/>
           </a:p>
@@ -3690,7 +3693,7 @@
             <a:fld id="{1E04AC61-63AC-8445-997C-669BD7969E4E}" type="datetime1">
               <a:rPr lang="en-US" smtClean="0"/>
               <a:pPr/>
-              <a:t>4/19/2018</a:t>
+              <a:t>4/26/2018</a:t>
             </a:fld>
             <a:endParaRPr lang="en-US"/>
           </a:p>
@@ -3962,7 +3965,7 @@
             <a:fld id="{CD6ED6C7-C2C5-C24C-AC8A-A91C9FF9B017}" type="datetime1">
               <a:rPr lang="en-US" smtClean="0"/>
               <a:pPr/>
-              <a:t>4/19/2018</a:t>
+              <a:t>4/26/2018</a:t>
             </a:fld>
             <a:endParaRPr lang="en-US"/>
           </a:p>
@@ -4211,7 +4214,7 @@
             <a:fld id="{D8C7839B-E887-0944-84C3-E700F2F6A56F}" type="datetime1">
               <a:rPr lang="en-US" smtClean="0"/>
               <a:pPr/>
-              <a:t>4/19/2018</a:t>
+              <a:t>4/26/2018</a:t>
             </a:fld>
             <a:endParaRPr lang="en-US"/>
           </a:p>
@@ -4419,7 +4422,7 @@
             <a:fld id="{CB6D0F97-75B8-7541-A107-497A429A2E0D}" type="datetime1">
               <a:rPr lang="en-US" smtClean="0"/>
               <a:pPr/>
-              <a:t>4/19/2018</a:t>
+              <a:t>4/26/2018</a:t>
             </a:fld>
             <a:endParaRPr lang="en-US"/>
           </a:p>
@@ -5942,7 +5945,7 @@
                 </a:solidFill>
                 <a:cs typeface="Times New Roman"/>
               </a:rPr>
-              <a:t>Note: You can show (please fill in the steps) that</a:t>
+              <a:t>Note: You can show (please fill in t	he steps) that</a:t>
             </a:r>
           </a:p>
           <a:p>
@@ -7252,7 +7255,7 @@
           <a:graphicData uri="http://schemas.openxmlformats.org/presentationml/2006/ole">
             <mc:AlternateContent xmlns:mc="http://schemas.openxmlformats.org/markup-compatibility/2006">
               <mc:Choice xmlns:v="urn:schemas-microsoft-com:vml" Requires="v">
-                <p:oleObj spid="_x0000_s44054" name="Equation" r:id="rId8" imgW="545760" imgH="177480" progId="Equation.3">
+                <p:oleObj spid="_x0000_s44070" name="Equation" r:id="rId8" imgW="545760" imgH="177480" progId="Equation.3">
                   <p:embed/>
                 </p:oleObj>
               </mc:Choice>
@@ -7322,7 +7325,7 @@
           <a:graphicData uri="http://schemas.openxmlformats.org/presentationml/2006/ole">
             <mc:AlternateContent xmlns:mc="http://schemas.openxmlformats.org/markup-compatibility/2006">
               <mc:Choice xmlns:v="urn:schemas-microsoft-com:vml" Requires="v">
-                <p:oleObj spid="_x0000_s44055" name="Equation" r:id="rId10" imgW="469800" imgH="177480" progId="Equation.3">
+                <p:oleObj spid="_x0000_s44071" name="Equation" r:id="rId10" imgW="469800" imgH="177480" progId="Equation.3">
                   <p:embed/>
                 </p:oleObj>
               </mc:Choice>
@@ -7392,7 +7395,7 @@
           <a:graphicData uri="http://schemas.openxmlformats.org/presentationml/2006/ole">
             <mc:AlternateContent xmlns:mc="http://schemas.openxmlformats.org/markup-compatibility/2006">
               <mc:Choice xmlns:v="urn:schemas-microsoft-com:vml" Requires="v">
-                <p:oleObj spid="_x0000_s44056" name="Equation" r:id="rId12" imgW="545760" imgH="177480" progId="Equation.3">
+                <p:oleObj spid="_x0000_s44072" name="Equation" r:id="rId12" imgW="545760" imgH="177480" progId="Equation.3">
                   <p:embed/>
                 </p:oleObj>
               </mc:Choice>
@@ -7462,7 +7465,7 @@
           <a:graphicData uri="http://schemas.openxmlformats.org/presentationml/2006/ole">
             <mc:AlternateContent xmlns:mc="http://schemas.openxmlformats.org/markup-compatibility/2006">
               <mc:Choice xmlns:v="urn:schemas-microsoft-com:vml" Requires="v">
-                <p:oleObj spid="_x0000_s44057" name="Equation" r:id="rId14" imgW="368140" imgH="177723" progId="Equation.3">
+                <p:oleObj spid="_x0000_s44073" name="Equation" r:id="rId14" imgW="368140" imgH="177723" progId="Equation.3">
                   <p:embed/>
                 </p:oleObj>
               </mc:Choice>
@@ -16187,7 +16190,7 @@
           <a:graphicData uri="http://schemas.openxmlformats.org/presentationml/2006/ole">
             <mc:AlternateContent xmlns:mc="http://schemas.openxmlformats.org/markup-compatibility/2006">
               <mc:Choice xmlns:v="urn:schemas-microsoft-com:vml" Requires="v">
-                <p:oleObj spid="_x0000_s63496" name="Equation" r:id="rId6" imgW="1663700" imgH="228600" progId="Equation.3">
+                <p:oleObj spid="_x0000_s63504" name="Equation" r:id="rId6" imgW="1663700" imgH="228600" progId="Equation.3">
                   <p:embed/>
                 </p:oleObj>
               </mc:Choice>
@@ -16257,7 +16260,7 @@
           <a:graphicData uri="http://schemas.openxmlformats.org/presentationml/2006/ole">
             <mc:AlternateContent xmlns:mc="http://schemas.openxmlformats.org/markup-compatibility/2006">
               <mc:Choice xmlns:v="urn:schemas-microsoft-com:vml" Requires="v">
-                <p:oleObj spid="_x0000_s63497" name="Equation" r:id="rId8" imgW="1752600" imgH="177800" progId="Equation.3">
+                <p:oleObj spid="_x0000_s63505" name="Equation" r:id="rId8" imgW="1752600" imgH="177800" progId="Equation.3">
                   <p:embed/>
                 </p:oleObj>
               </mc:Choice>
@@ -16618,7 +16621,7 @@
           <a:graphicData uri="http://schemas.openxmlformats.org/presentationml/2006/ole">
             <mc:AlternateContent xmlns:mc="http://schemas.openxmlformats.org/markup-compatibility/2006">
               <mc:Choice xmlns:v="urn:schemas-microsoft-com:vml" Requires="v">
-                <p:oleObj spid="_x0000_s66570" name="Equation" r:id="rId6" imgW="1841500" imgH="228600" progId="Equation.3">
+                <p:oleObj spid="_x0000_s66578" name="Equation" r:id="rId6" imgW="1841500" imgH="228600" progId="Equation.3">
                   <p:embed/>
                 </p:oleObj>
               </mc:Choice>
@@ -16688,7 +16691,7 @@
           <a:graphicData uri="http://schemas.openxmlformats.org/presentationml/2006/ole">
             <mc:AlternateContent xmlns:mc="http://schemas.openxmlformats.org/markup-compatibility/2006">
               <mc:Choice xmlns:v="urn:schemas-microsoft-com:vml" Requires="v">
-                <p:oleObj spid="_x0000_s66571" name="Equation" r:id="rId8" imgW="1663700" imgH="228600" progId="Equation.3">
+                <p:oleObj spid="_x0000_s66579" name="Equation" r:id="rId8" imgW="1663700" imgH="228600" progId="Equation.3">
                   <p:embed/>
                 </p:oleObj>
               </mc:Choice>

</xml_diff>